<commit_message>
added user image and a tag
</commit_message>
<xml_diff>
--- a/pictures/영화표.pptx
+++ b/pictures/영화표.pptx
@@ -250,7 +250,7 @@
           <a:p>
             <a:fld id="{1834B87F-3843-4A7F-8A8A-CD4A1A468B9A}" type="datetimeFigureOut">
               <a:rPr lang="ko-KR" altLang="en-US" smtClean="0"/>
-              <a:t>2020-10-27</a:t>
+              <a:t>2020-10-29</a:t>
             </a:fld>
             <a:endParaRPr lang="ko-KR" altLang="en-US"/>
           </a:p>
@@ -420,7 +420,7 @@
           <a:p>
             <a:fld id="{1834B87F-3843-4A7F-8A8A-CD4A1A468B9A}" type="datetimeFigureOut">
               <a:rPr lang="ko-KR" altLang="en-US" smtClean="0"/>
-              <a:t>2020-10-27</a:t>
+              <a:t>2020-10-29</a:t>
             </a:fld>
             <a:endParaRPr lang="ko-KR" altLang="en-US"/>
           </a:p>
@@ -600,7 +600,7 @@
           <a:p>
             <a:fld id="{1834B87F-3843-4A7F-8A8A-CD4A1A468B9A}" type="datetimeFigureOut">
               <a:rPr lang="ko-KR" altLang="en-US" smtClean="0"/>
-              <a:t>2020-10-27</a:t>
+              <a:t>2020-10-29</a:t>
             </a:fld>
             <a:endParaRPr lang="ko-KR" altLang="en-US"/>
           </a:p>
@@ -770,7 +770,7 @@
           <a:p>
             <a:fld id="{1834B87F-3843-4A7F-8A8A-CD4A1A468B9A}" type="datetimeFigureOut">
               <a:rPr lang="ko-KR" altLang="en-US" smtClean="0"/>
-              <a:t>2020-10-27</a:t>
+              <a:t>2020-10-29</a:t>
             </a:fld>
             <a:endParaRPr lang="ko-KR" altLang="en-US"/>
           </a:p>
@@ -1016,7 +1016,7 @@
           <a:p>
             <a:fld id="{1834B87F-3843-4A7F-8A8A-CD4A1A468B9A}" type="datetimeFigureOut">
               <a:rPr lang="ko-KR" altLang="en-US" smtClean="0"/>
-              <a:t>2020-10-27</a:t>
+              <a:t>2020-10-29</a:t>
             </a:fld>
             <a:endParaRPr lang="ko-KR" altLang="en-US"/>
           </a:p>
@@ -1248,7 +1248,7 @@
           <a:p>
             <a:fld id="{1834B87F-3843-4A7F-8A8A-CD4A1A468B9A}" type="datetimeFigureOut">
               <a:rPr lang="ko-KR" altLang="en-US" smtClean="0"/>
-              <a:t>2020-10-27</a:t>
+              <a:t>2020-10-29</a:t>
             </a:fld>
             <a:endParaRPr lang="ko-KR" altLang="en-US"/>
           </a:p>
@@ -1615,7 +1615,7 @@
           <a:p>
             <a:fld id="{1834B87F-3843-4A7F-8A8A-CD4A1A468B9A}" type="datetimeFigureOut">
               <a:rPr lang="ko-KR" altLang="en-US" smtClean="0"/>
-              <a:t>2020-10-27</a:t>
+              <a:t>2020-10-29</a:t>
             </a:fld>
             <a:endParaRPr lang="ko-KR" altLang="en-US"/>
           </a:p>
@@ -1733,7 +1733,7 @@
           <a:p>
             <a:fld id="{1834B87F-3843-4A7F-8A8A-CD4A1A468B9A}" type="datetimeFigureOut">
               <a:rPr lang="ko-KR" altLang="en-US" smtClean="0"/>
-              <a:t>2020-10-27</a:t>
+              <a:t>2020-10-29</a:t>
             </a:fld>
             <a:endParaRPr lang="ko-KR" altLang="en-US"/>
           </a:p>
@@ -1828,7 +1828,7 @@
           <a:p>
             <a:fld id="{1834B87F-3843-4A7F-8A8A-CD4A1A468B9A}" type="datetimeFigureOut">
               <a:rPr lang="ko-KR" altLang="en-US" smtClean="0"/>
-              <a:t>2020-10-27</a:t>
+              <a:t>2020-10-29</a:t>
             </a:fld>
             <a:endParaRPr lang="ko-KR" altLang="en-US"/>
           </a:p>
@@ -2105,7 +2105,7 @@
           <a:p>
             <a:fld id="{1834B87F-3843-4A7F-8A8A-CD4A1A468B9A}" type="datetimeFigureOut">
               <a:rPr lang="ko-KR" altLang="en-US" smtClean="0"/>
-              <a:t>2020-10-27</a:t>
+              <a:t>2020-10-29</a:t>
             </a:fld>
             <a:endParaRPr lang="ko-KR" altLang="en-US"/>
           </a:p>
@@ -2358,7 +2358,7 @@
           <a:p>
             <a:fld id="{1834B87F-3843-4A7F-8A8A-CD4A1A468B9A}" type="datetimeFigureOut">
               <a:rPr lang="ko-KR" altLang="en-US" smtClean="0"/>
-              <a:t>2020-10-27</a:t>
+              <a:t>2020-10-29</a:t>
             </a:fld>
             <a:endParaRPr lang="ko-KR" altLang="en-US"/>
           </a:p>
@@ -2571,7 +2571,7 @@
           <a:p>
             <a:fld id="{1834B87F-3843-4A7F-8A8A-CD4A1A468B9A}" type="datetimeFigureOut">
               <a:rPr lang="ko-KR" altLang="en-US" smtClean="0"/>
-              <a:t>2020-10-27</a:t>
+              <a:t>2020-10-29</a:t>
             </a:fld>
             <a:endParaRPr lang="ko-KR" altLang="en-US"/>
           </a:p>
@@ -3688,6 +3688,581 @@
           <a:chExt cx="0" cy="0"/>
         </a:xfrm>
       </p:grpSpPr>
+      <p:grpSp>
+        <p:nvGrpSpPr>
+          <p:cNvPr id="4" name="그룹 3"/>
+          <p:cNvGrpSpPr/>
+          <p:nvPr/>
+        </p:nvGrpSpPr>
+        <p:grpSpPr>
+          <a:xfrm>
+            <a:off x="3872086" y="1684868"/>
+            <a:ext cx="3431822" cy="3431822"/>
+            <a:chOff x="3872086" y="1684868"/>
+            <a:chExt cx="3431822" cy="3431822"/>
+          </a:xfrm>
+        </p:grpSpPr>
+        <p:sp>
+          <p:nvSpPr>
+            <p:cNvPr id="5" name="직사각형 4"/>
+            <p:cNvSpPr/>
+            <p:nvPr/>
+          </p:nvSpPr>
+          <p:spPr>
+            <a:xfrm>
+              <a:off x="3872086" y="1684868"/>
+              <a:ext cx="3431822" cy="3431822"/>
+            </a:xfrm>
+            <a:prstGeom prst="rect">
+              <a:avLst/>
+            </a:prstGeom>
+            <a:solidFill>
+              <a:srgbClr val="DCB8F2"/>
+            </a:solidFill>
+            <a:ln>
+              <a:noFill/>
+            </a:ln>
+          </p:spPr>
+          <p:style>
+            <a:lnRef idx="2">
+              <a:schemeClr val="accent1">
+                <a:shade val="50000"/>
+              </a:schemeClr>
+            </a:lnRef>
+            <a:fillRef idx="1">
+              <a:schemeClr val="accent1"/>
+            </a:fillRef>
+            <a:effectRef idx="0">
+              <a:schemeClr val="accent1"/>
+            </a:effectRef>
+            <a:fontRef idx="minor">
+              <a:schemeClr val="lt1"/>
+            </a:fontRef>
+          </p:style>
+          <p:txBody>
+            <a:bodyPr rtlCol="0" anchor="ctr"/>
+            <a:lstStyle/>
+            <a:p>
+              <a:pPr algn="ctr"/>
+              <a:endParaRPr lang="ko-KR" altLang="en-US"/>
+            </a:p>
+          </p:txBody>
+        </p:sp>
+        <p:sp>
+          <p:nvSpPr>
+            <p:cNvPr id="6" name="이등변 삼각형 5"/>
+            <p:cNvSpPr/>
+            <p:nvPr/>
+          </p:nvSpPr>
+          <p:spPr>
+            <a:xfrm>
+              <a:off x="4111021" y="4193823"/>
+              <a:ext cx="2984045" cy="922867"/>
+            </a:xfrm>
+            <a:prstGeom prst="triangle">
+              <a:avLst/>
+            </a:prstGeom>
+            <a:ln>
+              <a:noFill/>
+            </a:ln>
+          </p:spPr>
+          <p:style>
+            <a:lnRef idx="2">
+              <a:schemeClr val="accent1">
+                <a:shade val="50000"/>
+              </a:schemeClr>
+            </a:lnRef>
+            <a:fillRef idx="1">
+              <a:schemeClr val="accent1"/>
+            </a:fillRef>
+            <a:effectRef idx="0">
+              <a:schemeClr val="accent1"/>
+            </a:effectRef>
+            <a:fontRef idx="minor">
+              <a:schemeClr val="lt1"/>
+            </a:fontRef>
+          </p:style>
+          <p:txBody>
+            <a:bodyPr rtlCol="0" anchor="ctr"/>
+            <a:lstStyle/>
+            <a:p>
+              <a:pPr algn="ctr"/>
+              <a:endParaRPr lang="ko-KR" altLang="en-US"/>
+            </a:p>
+          </p:txBody>
+        </p:sp>
+        <p:sp>
+          <p:nvSpPr>
+            <p:cNvPr id="7" name="정오각형 6"/>
+            <p:cNvSpPr/>
+            <p:nvPr/>
+          </p:nvSpPr>
+          <p:spPr>
+            <a:xfrm>
+              <a:off x="4731519" y="2122312"/>
+              <a:ext cx="1712957" cy="2003778"/>
+            </a:xfrm>
+            <a:prstGeom prst="pentagon">
+              <a:avLst/>
+            </a:prstGeom>
+            <a:solidFill>
+              <a:srgbClr val="FFC000"/>
+            </a:solidFill>
+            <a:ln>
+              <a:noFill/>
+            </a:ln>
+          </p:spPr>
+          <p:style>
+            <a:lnRef idx="2">
+              <a:schemeClr val="accent1">
+                <a:shade val="50000"/>
+              </a:schemeClr>
+            </a:lnRef>
+            <a:fillRef idx="1">
+              <a:schemeClr val="accent1"/>
+            </a:fillRef>
+            <a:effectRef idx="0">
+              <a:schemeClr val="accent1"/>
+            </a:effectRef>
+            <a:fontRef idx="minor">
+              <a:schemeClr val="lt1"/>
+            </a:fontRef>
+          </p:style>
+          <p:txBody>
+            <a:bodyPr rtlCol="0" anchor="ctr"/>
+            <a:lstStyle/>
+            <a:p>
+              <a:pPr algn="ctr"/>
+              <a:endParaRPr lang="ko-KR" altLang="en-US"/>
+            </a:p>
+          </p:txBody>
+        </p:sp>
+        <p:sp>
+          <p:nvSpPr>
+            <p:cNvPr id="8" name="타원 7"/>
+            <p:cNvSpPr/>
+            <p:nvPr/>
+          </p:nvSpPr>
+          <p:spPr>
+            <a:xfrm>
+              <a:off x="4670645" y="2923821"/>
+              <a:ext cx="519377" cy="451555"/>
+            </a:xfrm>
+            <a:prstGeom prst="ellipse">
+              <a:avLst/>
+            </a:prstGeom>
+            <a:solidFill>
+              <a:srgbClr val="00B050"/>
+            </a:solidFill>
+            <a:ln>
+              <a:noFill/>
+            </a:ln>
+          </p:spPr>
+          <p:style>
+            <a:lnRef idx="2">
+              <a:schemeClr val="accent1">
+                <a:shade val="50000"/>
+              </a:schemeClr>
+            </a:lnRef>
+            <a:fillRef idx="1">
+              <a:schemeClr val="accent1"/>
+            </a:fillRef>
+            <a:effectRef idx="0">
+              <a:schemeClr val="accent1"/>
+            </a:effectRef>
+            <a:fontRef idx="minor">
+              <a:schemeClr val="lt1"/>
+            </a:fontRef>
+          </p:style>
+          <p:txBody>
+            <a:bodyPr rtlCol="0" anchor="ctr"/>
+            <a:lstStyle/>
+            <a:p>
+              <a:pPr algn="ctr"/>
+              <a:endParaRPr lang="ko-KR" altLang="en-US"/>
+            </a:p>
+          </p:txBody>
+        </p:sp>
+        <p:sp>
+          <p:nvSpPr>
+            <p:cNvPr id="9" name="사다리꼴 8"/>
+            <p:cNvSpPr/>
+            <p:nvPr/>
+          </p:nvSpPr>
+          <p:spPr>
+            <a:xfrm>
+              <a:off x="5215467" y="3149599"/>
+              <a:ext cx="745066" cy="1309512"/>
+            </a:xfrm>
+            <a:prstGeom prst="trapezoid">
+              <a:avLst/>
+            </a:prstGeom>
+            <a:solidFill>
+              <a:srgbClr val="00B050"/>
+            </a:solidFill>
+            <a:ln>
+              <a:noFill/>
+            </a:ln>
+          </p:spPr>
+          <p:style>
+            <a:lnRef idx="2">
+              <a:schemeClr val="accent1">
+                <a:shade val="50000"/>
+              </a:schemeClr>
+            </a:lnRef>
+            <a:fillRef idx="1">
+              <a:schemeClr val="accent1"/>
+            </a:fillRef>
+            <a:effectRef idx="0">
+              <a:schemeClr val="accent1"/>
+            </a:effectRef>
+            <a:fontRef idx="minor">
+              <a:schemeClr val="lt1"/>
+            </a:fontRef>
+          </p:style>
+          <p:txBody>
+            <a:bodyPr rtlCol="0" anchor="ctr"/>
+            <a:lstStyle/>
+            <a:p>
+              <a:pPr algn="ctr"/>
+              <a:endParaRPr lang="ko-KR" altLang="en-US"/>
+            </a:p>
+          </p:txBody>
+        </p:sp>
+        <p:sp>
+          <p:nvSpPr>
+            <p:cNvPr id="10" name="타원 9"/>
+            <p:cNvSpPr/>
+            <p:nvPr/>
+          </p:nvSpPr>
+          <p:spPr>
+            <a:xfrm>
+              <a:off x="5980070" y="2923821"/>
+              <a:ext cx="519377" cy="451555"/>
+            </a:xfrm>
+            <a:prstGeom prst="ellipse">
+              <a:avLst/>
+            </a:prstGeom>
+            <a:solidFill>
+              <a:srgbClr val="00B050"/>
+            </a:solidFill>
+            <a:ln>
+              <a:noFill/>
+            </a:ln>
+          </p:spPr>
+          <p:style>
+            <a:lnRef idx="2">
+              <a:schemeClr val="accent1">
+                <a:shade val="50000"/>
+              </a:schemeClr>
+            </a:lnRef>
+            <a:fillRef idx="1">
+              <a:schemeClr val="accent1"/>
+            </a:fillRef>
+            <a:effectRef idx="0">
+              <a:schemeClr val="accent1"/>
+            </a:effectRef>
+            <a:fontRef idx="minor">
+              <a:schemeClr val="lt1"/>
+            </a:fontRef>
+          </p:style>
+          <p:txBody>
+            <a:bodyPr rtlCol="0" anchor="ctr"/>
+            <a:lstStyle/>
+            <a:p>
+              <a:pPr algn="ctr"/>
+              <a:endParaRPr lang="ko-KR" altLang="en-US"/>
+            </a:p>
+          </p:txBody>
+        </p:sp>
+        <p:sp>
+          <p:nvSpPr>
+            <p:cNvPr id="11" name="달 10"/>
+            <p:cNvSpPr/>
+            <p:nvPr/>
+          </p:nvSpPr>
+          <p:spPr>
+            <a:xfrm>
+              <a:off x="4767566" y="3339851"/>
+              <a:ext cx="103050" cy="324722"/>
+            </a:xfrm>
+            <a:prstGeom prst="moon">
+              <a:avLst>
+                <a:gd name="adj" fmla="val 57483"/>
+              </a:avLst>
+            </a:prstGeom>
+            <a:solidFill>
+              <a:schemeClr val="accent2"/>
+            </a:solidFill>
+            <a:ln>
+              <a:noFill/>
+            </a:ln>
+          </p:spPr>
+          <p:style>
+            <a:lnRef idx="2">
+              <a:schemeClr val="accent1">
+                <a:shade val="50000"/>
+              </a:schemeClr>
+            </a:lnRef>
+            <a:fillRef idx="1">
+              <a:schemeClr val="accent1"/>
+            </a:fillRef>
+            <a:effectRef idx="0">
+              <a:schemeClr val="accent1"/>
+            </a:effectRef>
+            <a:fontRef idx="minor">
+              <a:schemeClr val="lt1"/>
+            </a:fontRef>
+          </p:style>
+          <p:txBody>
+            <a:bodyPr rtlCol="0" anchor="ctr"/>
+            <a:lstStyle/>
+            <a:p>
+              <a:pPr algn="ctr"/>
+              <a:endParaRPr lang="ko-KR" altLang="en-US"/>
+            </a:p>
+          </p:txBody>
+        </p:sp>
+        <p:sp>
+          <p:nvSpPr>
+            <p:cNvPr id="12" name="달 11"/>
+            <p:cNvSpPr/>
+            <p:nvPr/>
+          </p:nvSpPr>
+          <p:spPr>
+            <a:xfrm flipH="1">
+              <a:off x="4865428" y="3339851"/>
+              <a:ext cx="103050" cy="324722"/>
+            </a:xfrm>
+            <a:prstGeom prst="moon">
+              <a:avLst>
+                <a:gd name="adj" fmla="val 57483"/>
+              </a:avLst>
+            </a:prstGeom>
+            <a:solidFill>
+              <a:schemeClr val="accent2"/>
+            </a:solidFill>
+            <a:ln>
+              <a:noFill/>
+            </a:ln>
+          </p:spPr>
+          <p:style>
+            <a:lnRef idx="2">
+              <a:schemeClr val="accent1">
+                <a:shade val="50000"/>
+              </a:schemeClr>
+            </a:lnRef>
+            <a:fillRef idx="1">
+              <a:schemeClr val="accent1"/>
+            </a:fillRef>
+            <a:effectRef idx="0">
+              <a:schemeClr val="accent1"/>
+            </a:effectRef>
+            <a:fontRef idx="minor">
+              <a:schemeClr val="lt1"/>
+            </a:fontRef>
+          </p:style>
+          <p:txBody>
+            <a:bodyPr rtlCol="0" anchor="ctr"/>
+            <a:lstStyle/>
+            <a:p>
+              <a:pPr algn="ctr"/>
+              <a:endParaRPr lang="ko-KR" altLang="en-US"/>
+            </a:p>
+          </p:txBody>
+        </p:sp>
+        <p:sp>
+          <p:nvSpPr>
+            <p:cNvPr id="13" name="달 12"/>
+            <p:cNvSpPr/>
+            <p:nvPr/>
+          </p:nvSpPr>
+          <p:spPr>
+            <a:xfrm>
+              <a:off x="6228126" y="3339851"/>
+              <a:ext cx="103050" cy="324722"/>
+            </a:xfrm>
+            <a:prstGeom prst="moon">
+              <a:avLst>
+                <a:gd name="adj" fmla="val 57483"/>
+              </a:avLst>
+            </a:prstGeom>
+            <a:solidFill>
+              <a:schemeClr val="accent2"/>
+            </a:solidFill>
+            <a:ln>
+              <a:noFill/>
+            </a:ln>
+          </p:spPr>
+          <p:style>
+            <a:lnRef idx="2">
+              <a:schemeClr val="accent1">
+                <a:shade val="50000"/>
+              </a:schemeClr>
+            </a:lnRef>
+            <a:fillRef idx="1">
+              <a:schemeClr val="accent1"/>
+            </a:fillRef>
+            <a:effectRef idx="0">
+              <a:schemeClr val="accent1"/>
+            </a:effectRef>
+            <a:fontRef idx="minor">
+              <a:schemeClr val="lt1"/>
+            </a:fontRef>
+          </p:style>
+          <p:txBody>
+            <a:bodyPr rtlCol="0" anchor="ctr"/>
+            <a:lstStyle/>
+            <a:p>
+              <a:pPr algn="ctr"/>
+              <a:endParaRPr lang="ko-KR" altLang="en-US"/>
+            </a:p>
+          </p:txBody>
+        </p:sp>
+        <p:sp>
+          <p:nvSpPr>
+            <p:cNvPr id="14" name="달 13"/>
+            <p:cNvSpPr/>
+            <p:nvPr/>
+          </p:nvSpPr>
+          <p:spPr>
+            <a:xfrm flipH="1">
+              <a:off x="6325988" y="3339851"/>
+              <a:ext cx="103050" cy="324722"/>
+            </a:xfrm>
+            <a:prstGeom prst="moon">
+              <a:avLst>
+                <a:gd name="adj" fmla="val 57483"/>
+              </a:avLst>
+            </a:prstGeom>
+            <a:solidFill>
+              <a:schemeClr val="accent2"/>
+            </a:solidFill>
+            <a:ln>
+              <a:noFill/>
+            </a:ln>
+          </p:spPr>
+          <p:style>
+            <a:lnRef idx="2">
+              <a:schemeClr val="accent1">
+                <a:shade val="50000"/>
+              </a:schemeClr>
+            </a:lnRef>
+            <a:fillRef idx="1">
+              <a:schemeClr val="accent1"/>
+            </a:fillRef>
+            <a:effectRef idx="0">
+              <a:schemeClr val="accent1"/>
+            </a:effectRef>
+            <a:fontRef idx="minor">
+              <a:schemeClr val="lt1"/>
+            </a:fontRef>
+          </p:style>
+          <p:txBody>
+            <a:bodyPr rtlCol="0" anchor="ctr"/>
+            <a:lstStyle/>
+            <a:p>
+              <a:pPr algn="ctr"/>
+              <a:endParaRPr lang="ko-KR" altLang="en-US"/>
+            </a:p>
+          </p:txBody>
+        </p:sp>
+        <p:sp>
+          <p:nvSpPr>
+            <p:cNvPr id="15" name="타원 14"/>
+            <p:cNvSpPr/>
+            <p:nvPr/>
+          </p:nvSpPr>
+          <p:spPr>
+            <a:xfrm>
+              <a:off x="4786489" y="2190045"/>
+              <a:ext cx="1603022" cy="1603022"/>
+            </a:xfrm>
+            <a:prstGeom prst="ellipse">
+              <a:avLst/>
+            </a:prstGeom>
+            <a:solidFill>
+              <a:srgbClr val="00B050"/>
+            </a:solidFill>
+            <a:ln>
+              <a:noFill/>
+            </a:ln>
+          </p:spPr>
+          <p:style>
+            <a:lnRef idx="2">
+              <a:schemeClr val="accent1">
+                <a:shade val="50000"/>
+              </a:schemeClr>
+            </a:lnRef>
+            <a:fillRef idx="1">
+              <a:schemeClr val="accent1"/>
+            </a:fillRef>
+            <a:effectRef idx="0">
+              <a:schemeClr val="accent1"/>
+            </a:effectRef>
+            <a:fontRef idx="minor">
+              <a:schemeClr val="lt1"/>
+            </a:fontRef>
+          </p:style>
+          <p:txBody>
+            <a:bodyPr rtlCol="0" anchor="ctr"/>
+            <a:lstStyle/>
+            <a:p>
+              <a:pPr algn="ctr"/>
+              <a:endParaRPr lang="ko-KR" altLang="en-US"/>
+            </a:p>
+          </p:txBody>
+        </p:sp>
+        <p:sp>
+          <p:nvSpPr>
+            <p:cNvPr id="16" name="현 15"/>
+            <p:cNvSpPr/>
+            <p:nvPr/>
+          </p:nvSpPr>
+          <p:spPr>
+            <a:xfrm rot="8263650">
+              <a:off x="4713391" y="2124418"/>
+              <a:ext cx="1749215" cy="1708937"/>
+            </a:xfrm>
+            <a:prstGeom prst="chord">
+              <a:avLst>
+                <a:gd name="adj1" fmla="val 2789960"/>
+                <a:gd name="adj2" fmla="val 13160696"/>
+              </a:avLst>
+            </a:prstGeom>
+            <a:solidFill>
+              <a:srgbClr val="FFC000"/>
+            </a:solidFill>
+            <a:ln>
+              <a:noFill/>
+            </a:ln>
+          </p:spPr>
+          <p:style>
+            <a:lnRef idx="2">
+              <a:schemeClr val="accent1">
+                <a:shade val="50000"/>
+              </a:schemeClr>
+            </a:lnRef>
+            <a:fillRef idx="1">
+              <a:schemeClr val="accent1"/>
+            </a:fillRef>
+            <a:effectRef idx="0">
+              <a:schemeClr val="accent1"/>
+            </a:effectRef>
+            <a:fontRef idx="minor">
+              <a:schemeClr val="lt1"/>
+            </a:fontRef>
+          </p:style>
+          <p:txBody>
+            <a:bodyPr rtlCol="0" anchor="ctr"/>
+            <a:lstStyle/>
+            <a:p>
+              <a:pPr algn="ctr"/>
+              <a:endParaRPr lang="ko-KR" altLang="en-US"/>
+            </a:p>
+          </p:txBody>
+        </p:sp>
+      </p:grpSp>
     </p:spTree>
     <p:extLst>
       <p:ext uri="{BB962C8B-B14F-4D97-AF65-F5344CB8AC3E}">
@@ -3718,6 +4293,159 @@
           <a:chExt cx="0" cy="0"/>
         </a:xfrm>
       </p:grpSpPr>
+      <p:grpSp>
+        <p:nvGrpSpPr>
+          <p:cNvPr id="8" name="그룹 7"/>
+          <p:cNvGrpSpPr/>
+          <p:nvPr/>
+        </p:nvGrpSpPr>
+        <p:grpSpPr>
+          <a:xfrm>
+            <a:off x="3517751" y="892885"/>
+            <a:ext cx="4797911" cy="4797911"/>
+            <a:chOff x="3517751" y="892885"/>
+            <a:chExt cx="4797911" cy="4797911"/>
+          </a:xfrm>
+        </p:grpSpPr>
+        <p:sp>
+          <p:nvSpPr>
+            <p:cNvPr id="2" name="직사각형 1"/>
+            <p:cNvSpPr/>
+            <p:nvPr/>
+          </p:nvSpPr>
+          <p:spPr>
+            <a:xfrm>
+              <a:off x="3517751" y="892885"/>
+              <a:ext cx="4797911" cy="4797911"/>
+            </a:xfrm>
+            <a:prstGeom prst="rect">
+              <a:avLst/>
+            </a:prstGeom>
+            <a:solidFill>
+              <a:schemeClr val="bg2"/>
+            </a:solidFill>
+            <a:ln>
+              <a:noFill/>
+            </a:ln>
+          </p:spPr>
+          <p:style>
+            <a:lnRef idx="2">
+              <a:schemeClr val="accent1">
+                <a:shade val="50000"/>
+              </a:schemeClr>
+            </a:lnRef>
+            <a:fillRef idx="1">
+              <a:schemeClr val="accent1"/>
+            </a:fillRef>
+            <a:effectRef idx="0">
+              <a:schemeClr val="accent1"/>
+            </a:effectRef>
+            <a:fontRef idx="minor">
+              <a:schemeClr val="lt1"/>
+            </a:fontRef>
+          </p:style>
+          <p:txBody>
+            <a:bodyPr rtlCol="0" anchor="ctr"/>
+            <a:lstStyle/>
+            <a:p>
+              <a:pPr algn="ctr"/>
+              <a:endParaRPr lang="ko-KR" altLang="en-US"/>
+            </a:p>
+          </p:txBody>
+        </p:sp>
+        <p:sp>
+          <p:nvSpPr>
+            <p:cNvPr id="6" name="사다리꼴 5"/>
+            <p:cNvSpPr/>
+            <p:nvPr/>
+          </p:nvSpPr>
+          <p:spPr>
+            <a:xfrm flipV="1">
+              <a:off x="5341170" y="1487245"/>
+              <a:ext cx="1151068" cy="2571078"/>
+            </a:xfrm>
+            <a:prstGeom prst="trapezoid">
+              <a:avLst/>
+            </a:prstGeom>
+            <a:solidFill>
+              <a:srgbClr val="E2674E"/>
+            </a:solidFill>
+            <a:ln>
+              <a:noFill/>
+            </a:ln>
+          </p:spPr>
+          <p:style>
+            <a:lnRef idx="2">
+              <a:schemeClr val="accent1">
+                <a:shade val="50000"/>
+              </a:schemeClr>
+            </a:lnRef>
+            <a:fillRef idx="1">
+              <a:schemeClr val="accent1"/>
+            </a:fillRef>
+            <a:effectRef idx="0">
+              <a:schemeClr val="accent1"/>
+            </a:effectRef>
+            <a:fontRef idx="minor">
+              <a:schemeClr val="lt1"/>
+            </a:fontRef>
+          </p:style>
+          <p:txBody>
+            <a:bodyPr rtlCol="0" anchor="ctr"/>
+            <a:lstStyle/>
+            <a:p>
+              <a:pPr algn="ctr"/>
+              <a:endParaRPr lang="ko-KR" altLang="en-US"/>
+            </a:p>
+          </p:txBody>
+        </p:sp>
+        <p:sp>
+          <p:nvSpPr>
+            <p:cNvPr id="7" name="타원 6"/>
+            <p:cNvSpPr/>
+            <p:nvPr/>
+          </p:nvSpPr>
+          <p:spPr>
+            <a:xfrm>
+              <a:off x="5497156" y="4379707"/>
+              <a:ext cx="839097" cy="839097"/>
+            </a:xfrm>
+            <a:prstGeom prst="ellipse">
+              <a:avLst/>
+            </a:prstGeom>
+            <a:solidFill>
+              <a:srgbClr val="E2674E"/>
+            </a:solidFill>
+            <a:ln>
+              <a:noFill/>
+            </a:ln>
+          </p:spPr>
+          <p:style>
+            <a:lnRef idx="2">
+              <a:schemeClr val="accent1">
+                <a:shade val="50000"/>
+              </a:schemeClr>
+            </a:lnRef>
+            <a:fillRef idx="1">
+              <a:schemeClr val="accent1"/>
+            </a:fillRef>
+            <a:effectRef idx="0">
+              <a:schemeClr val="accent1"/>
+            </a:effectRef>
+            <a:fontRef idx="minor">
+              <a:schemeClr val="lt1"/>
+            </a:fontRef>
+          </p:style>
+          <p:txBody>
+            <a:bodyPr rtlCol="0" anchor="ctr"/>
+            <a:lstStyle/>
+            <a:p>
+              <a:pPr algn="ctr"/>
+              <a:endParaRPr lang="ko-KR" altLang="en-US"/>
+            </a:p>
+          </p:txBody>
+        </p:sp>
+      </p:grpSp>
     </p:spTree>
     <p:extLst>
       <p:ext uri="{BB962C8B-B14F-4D97-AF65-F5344CB8AC3E}">

</xml_diff>

<commit_message>
changed login page. html page -> modal
</commit_message>
<xml_diff>
--- a/pictures/영화표.pptx
+++ b/pictures/영화표.pptx
@@ -250,7 +250,7 @@
           <a:p>
             <a:fld id="{1834B87F-3843-4A7F-8A8A-CD4A1A468B9A}" type="datetimeFigureOut">
               <a:rPr lang="ko-KR" altLang="en-US" smtClean="0"/>
-              <a:t>2020-10-29</a:t>
+              <a:t>2020-11-12</a:t>
             </a:fld>
             <a:endParaRPr lang="ko-KR" altLang="en-US"/>
           </a:p>
@@ -420,7 +420,7 @@
           <a:p>
             <a:fld id="{1834B87F-3843-4A7F-8A8A-CD4A1A468B9A}" type="datetimeFigureOut">
               <a:rPr lang="ko-KR" altLang="en-US" smtClean="0"/>
-              <a:t>2020-10-29</a:t>
+              <a:t>2020-11-12</a:t>
             </a:fld>
             <a:endParaRPr lang="ko-KR" altLang="en-US"/>
           </a:p>
@@ -600,7 +600,7 @@
           <a:p>
             <a:fld id="{1834B87F-3843-4A7F-8A8A-CD4A1A468B9A}" type="datetimeFigureOut">
               <a:rPr lang="ko-KR" altLang="en-US" smtClean="0"/>
-              <a:t>2020-10-29</a:t>
+              <a:t>2020-11-12</a:t>
             </a:fld>
             <a:endParaRPr lang="ko-KR" altLang="en-US"/>
           </a:p>
@@ -770,7 +770,7 @@
           <a:p>
             <a:fld id="{1834B87F-3843-4A7F-8A8A-CD4A1A468B9A}" type="datetimeFigureOut">
               <a:rPr lang="ko-KR" altLang="en-US" smtClean="0"/>
-              <a:t>2020-10-29</a:t>
+              <a:t>2020-11-12</a:t>
             </a:fld>
             <a:endParaRPr lang="ko-KR" altLang="en-US"/>
           </a:p>
@@ -1016,7 +1016,7 @@
           <a:p>
             <a:fld id="{1834B87F-3843-4A7F-8A8A-CD4A1A468B9A}" type="datetimeFigureOut">
               <a:rPr lang="ko-KR" altLang="en-US" smtClean="0"/>
-              <a:t>2020-10-29</a:t>
+              <a:t>2020-11-12</a:t>
             </a:fld>
             <a:endParaRPr lang="ko-KR" altLang="en-US"/>
           </a:p>
@@ -1248,7 +1248,7 @@
           <a:p>
             <a:fld id="{1834B87F-3843-4A7F-8A8A-CD4A1A468B9A}" type="datetimeFigureOut">
               <a:rPr lang="ko-KR" altLang="en-US" smtClean="0"/>
-              <a:t>2020-10-29</a:t>
+              <a:t>2020-11-12</a:t>
             </a:fld>
             <a:endParaRPr lang="ko-KR" altLang="en-US"/>
           </a:p>
@@ -1615,7 +1615,7 @@
           <a:p>
             <a:fld id="{1834B87F-3843-4A7F-8A8A-CD4A1A468B9A}" type="datetimeFigureOut">
               <a:rPr lang="ko-KR" altLang="en-US" smtClean="0"/>
-              <a:t>2020-10-29</a:t>
+              <a:t>2020-11-12</a:t>
             </a:fld>
             <a:endParaRPr lang="ko-KR" altLang="en-US"/>
           </a:p>
@@ -1733,7 +1733,7 @@
           <a:p>
             <a:fld id="{1834B87F-3843-4A7F-8A8A-CD4A1A468B9A}" type="datetimeFigureOut">
               <a:rPr lang="ko-KR" altLang="en-US" smtClean="0"/>
-              <a:t>2020-10-29</a:t>
+              <a:t>2020-11-12</a:t>
             </a:fld>
             <a:endParaRPr lang="ko-KR" altLang="en-US"/>
           </a:p>
@@ -1828,7 +1828,7 @@
           <a:p>
             <a:fld id="{1834B87F-3843-4A7F-8A8A-CD4A1A468B9A}" type="datetimeFigureOut">
               <a:rPr lang="ko-KR" altLang="en-US" smtClean="0"/>
-              <a:t>2020-10-29</a:t>
+              <a:t>2020-11-12</a:t>
             </a:fld>
             <a:endParaRPr lang="ko-KR" altLang="en-US"/>
           </a:p>
@@ -2105,7 +2105,7 @@
           <a:p>
             <a:fld id="{1834B87F-3843-4A7F-8A8A-CD4A1A468B9A}" type="datetimeFigureOut">
               <a:rPr lang="ko-KR" altLang="en-US" smtClean="0"/>
-              <a:t>2020-10-29</a:t>
+              <a:t>2020-11-12</a:t>
             </a:fld>
             <a:endParaRPr lang="ko-KR" altLang="en-US"/>
           </a:p>
@@ -2358,7 +2358,7 @@
           <a:p>
             <a:fld id="{1834B87F-3843-4A7F-8A8A-CD4A1A468B9A}" type="datetimeFigureOut">
               <a:rPr lang="ko-KR" altLang="en-US" smtClean="0"/>
-              <a:t>2020-10-29</a:t>
+              <a:t>2020-11-12</a:t>
             </a:fld>
             <a:endParaRPr lang="ko-KR" altLang="en-US"/>
           </a:p>
@@ -2571,7 +2571,7 @@
           <a:p>
             <a:fld id="{1834B87F-3843-4A7F-8A8A-CD4A1A468B9A}" type="datetimeFigureOut">
               <a:rPr lang="ko-KR" altLang="en-US" smtClean="0"/>
-              <a:t>2020-10-29</a:t>
+              <a:t>2020-11-12</a:t>
             </a:fld>
             <a:endParaRPr lang="ko-KR" altLang="en-US"/>
           </a:p>
@@ -3696,7 +3696,7 @@
         </p:nvGrpSpPr>
         <p:grpSpPr>
           <a:xfrm>
-            <a:off x="3872086" y="1684868"/>
+            <a:off x="684043" y="1009365"/>
             <a:ext cx="3431822" cy="3431822"/>
             <a:chOff x="3872086" y="1684868"/>
             <a:chExt cx="3431822" cy="3431822"/>
@@ -4232,6 +4232,846 @@
             </a:prstGeom>
             <a:solidFill>
               <a:srgbClr val="FFC000"/>
+            </a:solidFill>
+            <a:ln>
+              <a:noFill/>
+            </a:ln>
+          </p:spPr>
+          <p:style>
+            <a:lnRef idx="2">
+              <a:schemeClr val="accent1">
+                <a:shade val="50000"/>
+              </a:schemeClr>
+            </a:lnRef>
+            <a:fillRef idx="1">
+              <a:schemeClr val="accent1"/>
+            </a:fillRef>
+            <a:effectRef idx="0">
+              <a:schemeClr val="accent1"/>
+            </a:effectRef>
+            <a:fontRef idx="minor">
+              <a:schemeClr val="lt1"/>
+            </a:fontRef>
+          </p:style>
+          <p:txBody>
+            <a:bodyPr rtlCol="0" anchor="ctr"/>
+            <a:lstStyle/>
+            <a:p>
+              <a:pPr algn="ctr"/>
+              <a:endParaRPr lang="ko-KR" altLang="en-US"/>
+            </a:p>
+          </p:txBody>
+        </p:sp>
+      </p:grpSp>
+      <p:grpSp>
+        <p:nvGrpSpPr>
+          <p:cNvPr id="17" name="그룹 16"/>
+          <p:cNvGrpSpPr/>
+          <p:nvPr/>
+        </p:nvGrpSpPr>
+        <p:grpSpPr>
+          <a:xfrm>
+            <a:off x="4349226" y="983962"/>
+            <a:ext cx="3431822" cy="3431822"/>
+            <a:chOff x="3872086" y="1684868"/>
+            <a:chExt cx="3431822" cy="3431822"/>
+          </a:xfrm>
+        </p:grpSpPr>
+        <p:sp>
+          <p:nvSpPr>
+            <p:cNvPr id="18" name="직사각형 17"/>
+            <p:cNvSpPr/>
+            <p:nvPr/>
+          </p:nvSpPr>
+          <p:spPr>
+            <a:xfrm>
+              <a:off x="3872086" y="1684868"/>
+              <a:ext cx="3431822" cy="3431822"/>
+            </a:xfrm>
+            <a:prstGeom prst="rect">
+              <a:avLst/>
+            </a:prstGeom>
+            <a:solidFill>
+              <a:srgbClr val="C4F3B7"/>
+            </a:solidFill>
+            <a:ln>
+              <a:noFill/>
+            </a:ln>
+          </p:spPr>
+          <p:style>
+            <a:lnRef idx="2">
+              <a:schemeClr val="accent1">
+                <a:shade val="50000"/>
+              </a:schemeClr>
+            </a:lnRef>
+            <a:fillRef idx="1">
+              <a:schemeClr val="accent1"/>
+            </a:fillRef>
+            <a:effectRef idx="0">
+              <a:schemeClr val="accent1"/>
+            </a:effectRef>
+            <a:fontRef idx="minor">
+              <a:schemeClr val="lt1"/>
+            </a:fontRef>
+          </p:style>
+          <p:txBody>
+            <a:bodyPr rtlCol="0" anchor="ctr"/>
+            <a:lstStyle/>
+            <a:p>
+              <a:pPr algn="ctr"/>
+              <a:endParaRPr lang="ko-KR" altLang="en-US"/>
+            </a:p>
+          </p:txBody>
+        </p:sp>
+        <p:sp>
+          <p:nvSpPr>
+            <p:cNvPr id="19" name="이등변 삼각형 18"/>
+            <p:cNvSpPr/>
+            <p:nvPr/>
+          </p:nvSpPr>
+          <p:spPr>
+            <a:xfrm>
+              <a:off x="4111021" y="4193823"/>
+              <a:ext cx="2984045" cy="922867"/>
+            </a:xfrm>
+            <a:prstGeom prst="triangle">
+              <a:avLst/>
+            </a:prstGeom>
+            <a:solidFill>
+              <a:srgbClr val="FFC000"/>
+            </a:solidFill>
+            <a:ln>
+              <a:noFill/>
+            </a:ln>
+          </p:spPr>
+          <p:style>
+            <a:lnRef idx="2">
+              <a:schemeClr val="accent1">
+                <a:shade val="50000"/>
+              </a:schemeClr>
+            </a:lnRef>
+            <a:fillRef idx="1">
+              <a:schemeClr val="accent1"/>
+            </a:fillRef>
+            <a:effectRef idx="0">
+              <a:schemeClr val="accent1"/>
+            </a:effectRef>
+            <a:fontRef idx="minor">
+              <a:schemeClr val="lt1"/>
+            </a:fontRef>
+          </p:style>
+          <p:txBody>
+            <a:bodyPr rtlCol="0" anchor="ctr"/>
+            <a:lstStyle/>
+            <a:p>
+              <a:pPr algn="ctr"/>
+              <a:endParaRPr lang="ko-KR" altLang="en-US"/>
+            </a:p>
+          </p:txBody>
+        </p:sp>
+        <p:sp>
+          <p:nvSpPr>
+            <p:cNvPr id="21" name="타원 20"/>
+            <p:cNvSpPr/>
+            <p:nvPr/>
+          </p:nvSpPr>
+          <p:spPr>
+            <a:xfrm>
+              <a:off x="4670645" y="2923821"/>
+              <a:ext cx="519377" cy="451555"/>
+            </a:xfrm>
+            <a:prstGeom prst="ellipse">
+              <a:avLst/>
+            </a:prstGeom>
+            <a:solidFill>
+              <a:srgbClr val="7030A0"/>
+            </a:solidFill>
+            <a:ln>
+              <a:noFill/>
+            </a:ln>
+          </p:spPr>
+          <p:style>
+            <a:lnRef idx="2">
+              <a:schemeClr val="accent1">
+                <a:shade val="50000"/>
+              </a:schemeClr>
+            </a:lnRef>
+            <a:fillRef idx="1">
+              <a:schemeClr val="accent1"/>
+            </a:fillRef>
+            <a:effectRef idx="0">
+              <a:schemeClr val="accent1"/>
+            </a:effectRef>
+            <a:fontRef idx="minor">
+              <a:schemeClr val="lt1"/>
+            </a:fontRef>
+          </p:style>
+          <p:txBody>
+            <a:bodyPr rtlCol="0" anchor="ctr"/>
+            <a:lstStyle/>
+            <a:p>
+              <a:pPr algn="ctr"/>
+              <a:endParaRPr lang="ko-KR" altLang="en-US"/>
+            </a:p>
+          </p:txBody>
+        </p:sp>
+        <p:sp>
+          <p:nvSpPr>
+            <p:cNvPr id="22" name="사다리꼴 21"/>
+            <p:cNvSpPr/>
+            <p:nvPr/>
+          </p:nvSpPr>
+          <p:spPr>
+            <a:xfrm>
+              <a:off x="5215467" y="3149599"/>
+              <a:ext cx="745066" cy="1309512"/>
+            </a:xfrm>
+            <a:prstGeom prst="trapezoid">
+              <a:avLst/>
+            </a:prstGeom>
+            <a:solidFill>
+              <a:srgbClr val="7030A0"/>
+            </a:solidFill>
+            <a:ln>
+              <a:noFill/>
+            </a:ln>
+          </p:spPr>
+          <p:style>
+            <a:lnRef idx="2">
+              <a:schemeClr val="accent1">
+                <a:shade val="50000"/>
+              </a:schemeClr>
+            </a:lnRef>
+            <a:fillRef idx="1">
+              <a:schemeClr val="accent1"/>
+            </a:fillRef>
+            <a:effectRef idx="0">
+              <a:schemeClr val="accent1"/>
+            </a:effectRef>
+            <a:fontRef idx="minor">
+              <a:schemeClr val="lt1"/>
+            </a:fontRef>
+          </p:style>
+          <p:txBody>
+            <a:bodyPr rtlCol="0" anchor="ctr"/>
+            <a:lstStyle/>
+            <a:p>
+              <a:pPr algn="ctr"/>
+              <a:endParaRPr lang="ko-KR" altLang="en-US"/>
+            </a:p>
+          </p:txBody>
+        </p:sp>
+        <p:sp>
+          <p:nvSpPr>
+            <p:cNvPr id="23" name="타원 22"/>
+            <p:cNvSpPr/>
+            <p:nvPr/>
+          </p:nvSpPr>
+          <p:spPr>
+            <a:xfrm>
+              <a:off x="5980070" y="2923821"/>
+              <a:ext cx="519377" cy="451555"/>
+            </a:xfrm>
+            <a:prstGeom prst="ellipse">
+              <a:avLst/>
+            </a:prstGeom>
+            <a:solidFill>
+              <a:srgbClr val="7030A0"/>
+            </a:solidFill>
+            <a:ln>
+              <a:noFill/>
+            </a:ln>
+          </p:spPr>
+          <p:style>
+            <a:lnRef idx="2">
+              <a:schemeClr val="accent1">
+                <a:shade val="50000"/>
+              </a:schemeClr>
+            </a:lnRef>
+            <a:fillRef idx="1">
+              <a:schemeClr val="accent1"/>
+            </a:fillRef>
+            <a:effectRef idx="0">
+              <a:schemeClr val="accent1"/>
+            </a:effectRef>
+            <a:fontRef idx="minor">
+              <a:schemeClr val="lt1"/>
+            </a:fontRef>
+          </p:style>
+          <p:txBody>
+            <a:bodyPr rtlCol="0" anchor="ctr"/>
+            <a:lstStyle/>
+            <a:p>
+              <a:pPr algn="ctr"/>
+              <a:endParaRPr lang="ko-KR" altLang="en-US"/>
+            </a:p>
+          </p:txBody>
+        </p:sp>
+        <p:sp>
+          <p:nvSpPr>
+            <p:cNvPr id="28" name="타원 27"/>
+            <p:cNvSpPr/>
+            <p:nvPr/>
+          </p:nvSpPr>
+          <p:spPr>
+            <a:xfrm>
+              <a:off x="4786489" y="2190045"/>
+              <a:ext cx="1603022" cy="1603022"/>
+            </a:xfrm>
+            <a:prstGeom prst="ellipse">
+              <a:avLst/>
+            </a:prstGeom>
+            <a:solidFill>
+              <a:srgbClr val="7030A0"/>
+            </a:solidFill>
+            <a:ln>
+              <a:noFill/>
+            </a:ln>
+          </p:spPr>
+          <p:style>
+            <a:lnRef idx="2">
+              <a:schemeClr val="accent1">
+                <a:shade val="50000"/>
+              </a:schemeClr>
+            </a:lnRef>
+            <a:fillRef idx="1">
+              <a:schemeClr val="accent1"/>
+            </a:fillRef>
+            <a:effectRef idx="0">
+              <a:schemeClr val="accent1"/>
+            </a:effectRef>
+            <a:fontRef idx="minor">
+              <a:schemeClr val="lt1"/>
+            </a:fontRef>
+          </p:style>
+          <p:txBody>
+            <a:bodyPr rtlCol="0" anchor="ctr"/>
+            <a:lstStyle/>
+            <a:p>
+              <a:pPr algn="ctr"/>
+              <a:endParaRPr lang="ko-KR" altLang="en-US"/>
+            </a:p>
+          </p:txBody>
+        </p:sp>
+        <p:sp>
+          <p:nvSpPr>
+            <p:cNvPr id="29" name="현 28"/>
+            <p:cNvSpPr/>
+            <p:nvPr/>
+          </p:nvSpPr>
+          <p:spPr>
+            <a:xfrm rot="8263650">
+              <a:off x="4713391" y="2124418"/>
+              <a:ext cx="1749215" cy="1708937"/>
+            </a:xfrm>
+            <a:prstGeom prst="chord">
+              <a:avLst>
+                <a:gd name="adj1" fmla="val 2789960"/>
+                <a:gd name="adj2" fmla="val 13160696"/>
+              </a:avLst>
+            </a:prstGeom>
+            <a:solidFill>
+              <a:srgbClr val="00B0F0"/>
+            </a:solidFill>
+            <a:ln>
+              <a:noFill/>
+            </a:ln>
+          </p:spPr>
+          <p:style>
+            <a:lnRef idx="2">
+              <a:schemeClr val="accent1">
+                <a:shade val="50000"/>
+              </a:schemeClr>
+            </a:lnRef>
+            <a:fillRef idx="1">
+              <a:schemeClr val="accent1"/>
+            </a:fillRef>
+            <a:effectRef idx="0">
+              <a:schemeClr val="accent1"/>
+            </a:effectRef>
+            <a:fontRef idx="minor">
+              <a:schemeClr val="lt1"/>
+            </a:fontRef>
+          </p:style>
+          <p:txBody>
+            <a:bodyPr rtlCol="0" anchor="ctr"/>
+            <a:lstStyle/>
+            <a:p>
+              <a:pPr algn="ctr"/>
+              <a:endParaRPr lang="ko-KR" altLang="en-US"/>
+            </a:p>
+          </p:txBody>
+        </p:sp>
+      </p:grpSp>
+      <p:grpSp>
+        <p:nvGrpSpPr>
+          <p:cNvPr id="58" name="그룹 57"/>
+          <p:cNvGrpSpPr/>
+          <p:nvPr/>
+        </p:nvGrpSpPr>
+        <p:grpSpPr>
+          <a:xfrm>
+            <a:off x="8165652" y="983962"/>
+            <a:ext cx="3431822" cy="3431822"/>
+            <a:chOff x="8165652" y="983962"/>
+            <a:chExt cx="3431822" cy="3431822"/>
+          </a:xfrm>
+        </p:grpSpPr>
+        <p:grpSp>
+          <p:nvGrpSpPr>
+            <p:cNvPr id="56" name="그룹 55"/>
+            <p:cNvGrpSpPr/>
+            <p:nvPr/>
+          </p:nvGrpSpPr>
+          <p:grpSpPr>
+            <a:xfrm>
+              <a:off x="8165652" y="983962"/>
+              <a:ext cx="3431822" cy="3431822"/>
+              <a:chOff x="3657937" y="2855099"/>
+              <a:chExt cx="3431822" cy="3431822"/>
+            </a:xfrm>
+          </p:grpSpPr>
+          <p:sp>
+            <p:nvSpPr>
+              <p:cNvPr id="41" name="직사각형 40"/>
+              <p:cNvSpPr/>
+              <p:nvPr/>
+            </p:nvSpPr>
+            <p:spPr>
+              <a:xfrm>
+                <a:off x="3657937" y="2855099"/>
+                <a:ext cx="3431822" cy="3431822"/>
+              </a:xfrm>
+              <a:prstGeom prst="rect">
+                <a:avLst/>
+              </a:prstGeom>
+              <a:solidFill>
+                <a:srgbClr val="FFC000"/>
+              </a:solidFill>
+              <a:ln>
+                <a:noFill/>
+              </a:ln>
+            </p:spPr>
+            <p:style>
+              <a:lnRef idx="2">
+                <a:schemeClr val="accent1">
+                  <a:shade val="50000"/>
+                </a:schemeClr>
+              </a:lnRef>
+              <a:fillRef idx="1">
+                <a:schemeClr val="accent1"/>
+              </a:fillRef>
+              <a:effectRef idx="0">
+                <a:schemeClr val="accent1"/>
+              </a:effectRef>
+              <a:fontRef idx="minor">
+                <a:schemeClr val="lt1"/>
+              </a:fontRef>
+            </p:style>
+            <p:txBody>
+              <a:bodyPr rtlCol="0" anchor="ctr"/>
+              <a:lstStyle/>
+              <a:p>
+                <a:pPr algn="ctr"/>
+                <a:endParaRPr lang="ko-KR" altLang="en-US"/>
+              </a:p>
+            </p:txBody>
+          </p:sp>
+          <p:sp>
+            <p:nvSpPr>
+              <p:cNvPr id="53" name="사다리꼴 52"/>
+              <p:cNvSpPr/>
+              <p:nvPr/>
+            </p:nvSpPr>
+            <p:spPr>
+              <a:xfrm rot="10800000">
+                <a:off x="4531991" y="4164610"/>
+                <a:ext cx="1677811" cy="2012625"/>
+              </a:xfrm>
+              <a:prstGeom prst="trapezoid">
+                <a:avLst>
+                  <a:gd name="adj" fmla="val 11789"/>
+                </a:avLst>
+              </a:prstGeom>
+              <a:solidFill>
+                <a:schemeClr val="accent2">
+                  <a:lumMod val="75000"/>
+                </a:schemeClr>
+              </a:solidFill>
+              <a:ln>
+                <a:noFill/>
+              </a:ln>
+            </p:spPr>
+            <p:style>
+              <a:lnRef idx="2">
+                <a:schemeClr val="accent1">
+                  <a:shade val="50000"/>
+                </a:schemeClr>
+              </a:lnRef>
+              <a:fillRef idx="1">
+                <a:schemeClr val="accent1"/>
+              </a:fillRef>
+              <a:effectRef idx="0">
+                <a:schemeClr val="accent1"/>
+              </a:effectRef>
+              <a:fontRef idx="minor">
+                <a:schemeClr val="lt1"/>
+              </a:fontRef>
+            </p:style>
+            <p:txBody>
+              <a:bodyPr rtlCol="0" anchor="ctr"/>
+              <a:lstStyle/>
+              <a:p>
+                <a:pPr algn="ctr"/>
+                <a:endParaRPr lang="ko-KR" altLang="en-US"/>
+              </a:p>
+            </p:txBody>
+          </p:sp>
+          <p:sp>
+            <p:nvSpPr>
+              <p:cNvPr id="51" name="타원 50"/>
+              <p:cNvSpPr/>
+              <p:nvPr/>
+            </p:nvSpPr>
+            <p:spPr>
+              <a:xfrm>
+                <a:off x="4572340" y="3360276"/>
+                <a:ext cx="1603022" cy="1603022"/>
+              </a:xfrm>
+              <a:prstGeom prst="ellipse">
+                <a:avLst/>
+              </a:prstGeom>
+              <a:solidFill>
+                <a:srgbClr val="0070C0"/>
+              </a:solidFill>
+              <a:ln>
+                <a:noFill/>
+              </a:ln>
+            </p:spPr>
+            <p:style>
+              <a:lnRef idx="2">
+                <a:schemeClr val="accent1">
+                  <a:shade val="50000"/>
+                </a:schemeClr>
+              </a:lnRef>
+              <a:fillRef idx="1">
+                <a:schemeClr val="accent1"/>
+              </a:fillRef>
+              <a:effectRef idx="0">
+                <a:schemeClr val="accent1"/>
+              </a:effectRef>
+              <a:fontRef idx="minor">
+                <a:schemeClr val="lt1"/>
+              </a:fontRef>
+            </p:style>
+            <p:txBody>
+              <a:bodyPr rtlCol="0" anchor="ctr"/>
+              <a:lstStyle/>
+              <a:p>
+                <a:pPr algn="ctr"/>
+                <a:endParaRPr lang="ko-KR" altLang="en-US"/>
+              </a:p>
+            </p:txBody>
+          </p:sp>
+          <p:sp>
+            <p:nvSpPr>
+              <p:cNvPr id="44" name="타원 43"/>
+              <p:cNvSpPr/>
+              <p:nvPr/>
+            </p:nvSpPr>
+            <p:spPr>
+              <a:xfrm>
+                <a:off x="4456496" y="4094052"/>
+                <a:ext cx="519377" cy="451555"/>
+              </a:xfrm>
+              <a:prstGeom prst="ellipse">
+                <a:avLst/>
+              </a:prstGeom>
+              <a:solidFill>
+                <a:srgbClr val="0070C0"/>
+              </a:solidFill>
+              <a:ln>
+                <a:noFill/>
+              </a:ln>
+            </p:spPr>
+            <p:style>
+              <a:lnRef idx="2">
+                <a:schemeClr val="accent1">
+                  <a:shade val="50000"/>
+                </a:schemeClr>
+              </a:lnRef>
+              <a:fillRef idx="1">
+                <a:schemeClr val="accent1"/>
+              </a:fillRef>
+              <a:effectRef idx="0">
+                <a:schemeClr val="accent1"/>
+              </a:effectRef>
+              <a:fontRef idx="minor">
+                <a:schemeClr val="lt1"/>
+              </a:fontRef>
+            </p:style>
+            <p:txBody>
+              <a:bodyPr rtlCol="0" anchor="ctr"/>
+              <a:lstStyle/>
+              <a:p>
+                <a:pPr algn="ctr"/>
+                <a:endParaRPr lang="ko-KR" altLang="en-US"/>
+              </a:p>
+            </p:txBody>
+          </p:sp>
+          <p:sp>
+            <p:nvSpPr>
+              <p:cNvPr id="46" name="타원 45"/>
+              <p:cNvSpPr/>
+              <p:nvPr/>
+            </p:nvSpPr>
+            <p:spPr>
+              <a:xfrm>
+                <a:off x="5765921" y="4094052"/>
+                <a:ext cx="519377" cy="451555"/>
+              </a:xfrm>
+              <a:prstGeom prst="ellipse">
+                <a:avLst/>
+              </a:prstGeom>
+              <a:solidFill>
+                <a:srgbClr val="0070C0"/>
+              </a:solidFill>
+              <a:ln>
+                <a:noFill/>
+              </a:ln>
+            </p:spPr>
+            <p:style>
+              <a:lnRef idx="2">
+                <a:schemeClr val="accent1">
+                  <a:shade val="50000"/>
+                </a:schemeClr>
+              </a:lnRef>
+              <a:fillRef idx="1">
+                <a:schemeClr val="accent1"/>
+              </a:fillRef>
+              <a:effectRef idx="0">
+                <a:schemeClr val="accent1"/>
+              </a:effectRef>
+              <a:fontRef idx="minor">
+                <a:schemeClr val="lt1"/>
+              </a:fontRef>
+            </p:style>
+            <p:txBody>
+              <a:bodyPr rtlCol="0" anchor="ctr"/>
+              <a:lstStyle/>
+              <a:p>
+                <a:pPr algn="ctr"/>
+                <a:endParaRPr lang="ko-KR" altLang="en-US"/>
+              </a:p>
+            </p:txBody>
+          </p:sp>
+          <p:sp>
+            <p:nvSpPr>
+              <p:cNvPr id="54" name="달 53"/>
+              <p:cNvSpPr/>
+              <p:nvPr/>
+            </p:nvSpPr>
+            <p:spPr>
+              <a:xfrm rot="5400000">
+                <a:off x="4928488" y="2917736"/>
+                <a:ext cx="894188" cy="1599560"/>
+              </a:xfrm>
+              <a:prstGeom prst="moon">
+                <a:avLst>
+                  <a:gd name="adj" fmla="val 32524"/>
+                </a:avLst>
+              </a:prstGeom>
+              <a:solidFill>
+                <a:schemeClr val="accent2">
+                  <a:lumMod val="75000"/>
+                </a:schemeClr>
+              </a:solidFill>
+              <a:ln>
+                <a:noFill/>
+              </a:ln>
+            </p:spPr>
+            <p:style>
+              <a:lnRef idx="2">
+                <a:schemeClr val="accent1">
+                  <a:shade val="50000"/>
+                </a:schemeClr>
+              </a:lnRef>
+              <a:fillRef idx="1">
+                <a:schemeClr val="accent1"/>
+              </a:fillRef>
+              <a:effectRef idx="0">
+                <a:schemeClr val="accent1"/>
+              </a:effectRef>
+              <a:fontRef idx="minor">
+                <a:schemeClr val="lt1"/>
+              </a:fontRef>
+            </p:style>
+            <p:txBody>
+              <a:bodyPr rtlCol="0" anchor="ctr"/>
+              <a:lstStyle/>
+              <a:p>
+                <a:pPr algn="ctr"/>
+                <a:endParaRPr lang="ko-KR" altLang="en-US"/>
+              </a:p>
+            </p:txBody>
+          </p:sp>
+          <p:sp>
+            <p:nvSpPr>
+              <p:cNvPr id="42" name="이등변 삼각형 41"/>
+              <p:cNvSpPr/>
+              <p:nvPr/>
+            </p:nvSpPr>
+            <p:spPr>
+              <a:xfrm>
+                <a:off x="3896872" y="5364054"/>
+                <a:ext cx="2984045" cy="922867"/>
+              </a:xfrm>
+              <a:prstGeom prst="triangle">
+                <a:avLst/>
+              </a:prstGeom>
+              <a:solidFill>
+                <a:srgbClr val="00B050"/>
+              </a:solidFill>
+              <a:ln>
+                <a:noFill/>
+              </a:ln>
+            </p:spPr>
+            <p:style>
+              <a:lnRef idx="2">
+                <a:schemeClr val="accent1">
+                  <a:shade val="50000"/>
+                </a:schemeClr>
+              </a:lnRef>
+              <a:fillRef idx="1">
+                <a:schemeClr val="accent1"/>
+              </a:fillRef>
+              <a:effectRef idx="0">
+                <a:schemeClr val="accent1"/>
+              </a:effectRef>
+              <a:fontRef idx="minor">
+                <a:schemeClr val="lt1"/>
+              </a:fontRef>
+            </p:style>
+            <p:txBody>
+              <a:bodyPr rtlCol="0" anchor="ctr"/>
+              <a:lstStyle/>
+              <a:p>
+                <a:pPr algn="ctr"/>
+                <a:endParaRPr lang="ko-KR" altLang="en-US"/>
+              </a:p>
+            </p:txBody>
+          </p:sp>
+          <p:sp>
+            <p:nvSpPr>
+              <p:cNvPr id="45" name="사다리꼴 44"/>
+              <p:cNvSpPr/>
+              <p:nvPr/>
+            </p:nvSpPr>
+            <p:spPr>
+              <a:xfrm>
+                <a:off x="5001318" y="4319830"/>
+                <a:ext cx="745066" cy="1309512"/>
+              </a:xfrm>
+              <a:prstGeom prst="trapezoid">
+                <a:avLst/>
+              </a:prstGeom>
+              <a:solidFill>
+                <a:srgbClr val="0070C0"/>
+              </a:solidFill>
+              <a:ln>
+                <a:noFill/>
+              </a:ln>
+            </p:spPr>
+            <p:style>
+              <a:lnRef idx="2">
+                <a:schemeClr val="accent1">
+                  <a:shade val="50000"/>
+                </a:schemeClr>
+              </a:lnRef>
+              <a:fillRef idx="1">
+                <a:schemeClr val="accent1"/>
+              </a:fillRef>
+              <a:effectRef idx="0">
+                <a:schemeClr val="accent1"/>
+              </a:effectRef>
+              <a:fontRef idx="minor">
+                <a:schemeClr val="lt1"/>
+              </a:fontRef>
+            </p:style>
+            <p:txBody>
+              <a:bodyPr rtlCol="0" anchor="ctr"/>
+              <a:lstStyle/>
+              <a:p>
+                <a:pPr algn="ctr"/>
+                <a:endParaRPr lang="ko-KR" altLang="en-US"/>
+              </a:p>
+            </p:txBody>
+          </p:sp>
+          <p:sp>
+            <p:nvSpPr>
+              <p:cNvPr id="55" name="이등변 삼각형 54"/>
+              <p:cNvSpPr/>
+              <p:nvPr/>
+            </p:nvSpPr>
+            <p:spPr>
+              <a:xfrm>
+                <a:off x="5353050" y="3312319"/>
+                <a:ext cx="45719" cy="254794"/>
+              </a:xfrm>
+              <a:prstGeom prst="triangle">
+                <a:avLst/>
+              </a:prstGeom>
+              <a:solidFill>
+                <a:srgbClr val="0070C0"/>
+              </a:solidFill>
+              <a:ln>
+                <a:noFill/>
+              </a:ln>
+            </p:spPr>
+            <p:style>
+              <a:lnRef idx="2">
+                <a:schemeClr val="accent1">
+                  <a:shade val="50000"/>
+                </a:schemeClr>
+              </a:lnRef>
+              <a:fillRef idx="1">
+                <a:schemeClr val="accent1"/>
+              </a:fillRef>
+              <a:effectRef idx="0">
+                <a:schemeClr val="accent1"/>
+              </a:effectRef>
+              <a:fontRef idx="minor">
+                <a:schemeClr val="lt1"/>
+              </a:fontRef>
+            </p:style>
+            <p:txBody>
+              <a:bodyPr rtlCol="0" anchor="ctr"/>
+              <a:lstStyle/>
+              <a:p>
+                <a:pPr algn="ctr"/>
+                <a:endParaRPr lang="ko-KR" altLang="en-US"/>
+              </a:p>
+            </p:txBody>
+          </p:sp>
+        </p:grpSp>
+        <p:sp>
+          <p:nvSpPr>
+            <p:cNvPr id="57" name="사다리꼴 56"/>
+            <p:cNvSpPr/>
+            <p:nvPr/>
+          </p:nvSpPr>
+          <p:spPr>
+            <a:xfrm>
+              <a:off x="9509033" y="3247381"/>
+              <a:ext cx="745066" cy="514391"/>
+            </a:xfrm>
+            <a:prstGeom prst="trapezoid">
+              <a:avLst>
+                <a:gd name="adj" fmla="val 10552"/>
+              </a:avLst>
+            </a:prstGeom>
+            <a:solidFill>
+              <a:srgbClr val="00B050"/>
             </a:solidFill>
             <a:ln>
               <a:noFill/>
@@ -4322,7 +5162,10 @@
               <a:avLst/>
             </a:prstGeom>
             <a:solidFill>
-              <a:schemeClr val="bg2"/>
+              <a:schemeClr val="accent1">
+                <a:lumMod val="40000"/>
+                <a:lumOff val="60000"/>
+              </a:schemeClr>
             </a:solidFill>
             <a:ln>
               <a:noFill/>
@@ -4476,6 +5319,30 @@
           <a:chExt cx="0" cy="0"/>
         </a:xfrm>
       </p:grpSpPr>
+      <p:pic>
+        <p:nvPicPr>
+          <p:cNvPr id="3" name="그림 2"/>
+          <p:cNvPicPr>
+            <a:picLocks noChangeAspect="1"/>
+          </p:cNvPicPr>
+          <p:nvPr/>
+        </p:nvPicPr>
+        <p:blipFill>
+          <a:blip r:embed="rId2"/>
+          <a:stretch>
+            <a:fillRect/>
+          </a:stretch>
+        </p:blipFill>
+        <p:spPr>
+          <a:xfrm>
+            <a:off x="2714367" y="1607794"/>
+            <a:ext cx="304800" cy="314325"/>
+          </a:xfrm>
+          <a:prstGeom prst="rect">
+            <a:avLst/>
+          </a:prstGeom>
+        </p:spPr>
+      </p:pic>
     </p:spTree>
     <p:extLst>
       <p:ext uri="{BB962C8B-B14F-4D97-AF65-F5344CB8AC3E}">

</xml_diff>

<commit_message>
Clear up pictures folder
</commit_message>
<xml_diff>
--- a/pictures/영화표.pptx
+++ b/pictures/영화표.pptx
@@ -250,7 +250,7 @@
           <a:p>
             <a:fld id="{1834B87F-3843-4A7F-8A8A-CD4A1A468B9A}" type="datetimeFigureOut">
               <a:rPr lang="ko-KR" altLang="en-US" smtClean="0"/>
-              <a:t>2020-11-15</a:t>
+              <a:t>2020-11-17</a:t>
             </a:fld>
             <a:endParaRPr lang="ko-KR" altLang="en-US"/>
           </a:p>
@@ -420,7 +420,7 @@
           <a:p>
             <a:fld id="{1834B87F-3843-4A7F-8A8A-CD4A1A468B9A}" type="datetimeFigureOut">
               <a:rPr lang="ko-KR" altLang="en-US" smtClean="0"/>
-              <a:t>2020-11-15</a:t>
+              <a:t>2020-11-17</a:t>
             </a:fld>
             <a:endParaRPr lang="ko-KR" altLang="en-US"/>
           </a:p>
@@ -600,7 +600,7 @@
           <a:p>
             <a:fld id="{1834B87F-3843-4A7F-8A8A-CD4A1A468B9A}" type="datetimeFigureOut">
               <a:rPr lang="ko-KR" altLang="en-US" smtClean="0"/>
-              <a:t>2020-11-15</a:t>
+              <a:t>2020-11-17</a:t>
             </a:fld>
             <a:endParaRPr lang="ko-KR" altLang="en-US"/>
           </a:p>
@@ -770,7 +770,7 @@
           <a:p>
             <a:fld id="{1834B87F-3843-4A7F-8A8A-CD4A1A468B9A}" type="datetimeFigureOut">
               <a:rPr lang="ko-KR" altLang="en-US" smtClean="0"/>
-              <a:t>2020-11-15</a:t>
+              <a:t>2020-11-17</a:t>
             </a:fld>
             <a:endParaRPr lang="ko-KR" altLang="en-US"/>
           </a:p>
@@ -1016,7 +1016,7 @@
           <a:p>
             <a:fld id="{1834B87F-3843-4A7F-8A8A-CD4A1A468B9A}" type="datetimeFigureOut">
               <a:rPr lang="ko-KR" altLang="en-US" smtClean="0"/>
-              <a:t>2020-11-15</a:t>
+              <a:t>2020-11-17</a:t>
             </a:fld>
             <a:endParaRPr lang="ko-KR" altLang="en-US"/>
           </a:p>
@@ -1248,7 +1248,7 @@
           <a:p>
             <a:fld id="{1834B87F-3843-4A7F-8A8A-CD4A1A468B9A}" type="datetimeFigureOut">
               <a:rPr lang="ko-KR" altLang="en-US" smtClean="0"/>
-              <a:t>2020-11-15</a:t>
+              <a:t>2020-11-17</a:t>
             </a:fld>
             <a:endParaRPr lang="ko-KR" altLang="en-US"/>
           </a:p>
@@ -1615,7 +1615,7 @@
           <a:p>
             <a:fld id="{1834B87F-3843-4A7F-8A8A-CD4A1A468B9A}" type="datetimeFigureOut">
               <a:rPr lang="ko-KR" altLang="en-US" smtClean="0"/>
-              <a:t>2020-11-15</a:t>
+              <a:t>2020-11-17</a:t>
             </a:fld>
             <a:endParaRPr lang="ko-KR" altLang="en-US"/>
           </a:p>
@@ -1733,7 +1733,7 @@
           <a:p>
             <a:fld id="{1834B87F-3843-4A7F-8A8A-CD4A1A468B9A}" type="datetimeFigureOut">
               <a:rPr lang="ko-KR" altLang="en-US" smtClean="0"/>
-              <a:t>2020-11-15</a:t>
+              <a:t>2020-11-17</a:t>
             </a:fld>
             <a:endParaRPr lang="ko-KR" altLang="en-US"/>
           </a:p>
@@ -1828,7 +1828,7 @@
           <a:p>
             <a:fld id="{1834B87F-3843-4A7F-8A8A-CD4A1A468B9A}" type="datetimeFigureOut">
               <a:rPr lang="ko-KR" altLang="en-US" smtClean="0"/>
-              <a:t>2020-11-15</a:t>
+              <a:t>2020-11-17</a:t>
             </a:fld>
             <a:endParaRPr lang="ko-KR" altLang="en-US"/>
           </a:p>
@@ -2105,7 +2105,7 @@
           <a:p>
             <a:fld id="{1834B87F-3843-4A7F-8A8A-CD4A1A468B9A}" type="datetimeFigureOut">
               <a:rPr lang="ko-KR" altLang="en-US" smtClean="0"/>
-              <a:t>2020-11-15</a:t>
+              <a:t>2020-11-17</a:t>
             </a:fld>
             <a:endParaRPr lang="ko-KR" altLang="en-US"/>
           </a:p>
@@ -2358,7 +2358,7 @@
           <a:p>
             <a:fld id="{1834B87F-3843-4A7F-8A8A-CD4A1A468B9A}" type="datetimeFigureOut">
               <a:rPr lang="ko-KR" altLang="en-US" smtClean="0"/>
-              <a:t>2020-11-15</a:t>
+              <a:t>2020-11-17</a:t>
             </a:fld>
             <a:endParaRPr lang="ko-KR" altLang="en-US"/>
           </a:p>
@@ -2571,7 +2571,7 @@
           <a:p>
             <a:fld id="{1834B87F-3843-4A7F-8A8A-CD4A1A468B9A}" type="datetimeFigureOut">
               <a:rPr lang="ko-KR" altLang="en-US" smtClean="0"/>
-              <a:t>2020-11-15</a:t>
+              <a:t>2020-11-17</a:t>
             </a:fld>
             <a:endParaRPr lang="ko-KR" altLang="en-US"/>
           </a:p>
@@ -5366,6 +5366,54 @@
           </a:prstGeom>
         </p:spPr>
       </p:pic>
+      <p:sp>
+        <p:nvSpPr>
+          <p:cNvPr id="4" name="직사각형 3"/>
+          <p:cNvSpPr/>
+          <p:nvPr/>
+        </p:nvSpPr>
+        <p:spPr>
+          <a:xfrm>
+            <a:off x="5898292" y="1607794"/>
+            <a:ext cx="691978" cy="525806"/>
+          </a:xfrm>
+          <a:prstGeom prst="rect">
+            <a:avLst/>
+          </a:prstGeom>
+          <a:solidFill>
+            <a:srgbClr val="000000">
+              <a:alpha val="50196"/>
+            </a:srgbClr>
+          </a:solidFill>
+          <a:ln>
+            <a:noFill/>
+          </a:ln>
+        </p:spPr>
+        <p:style>
+          <a:lnRef idx="2">
+            <a:schemeClr val="accent1">
+              <a:shade val="50000"/>
+            </a:schemeClr>
+          </a:lnRef>
+          <a:fillRef idx="1">
+            <a:schemeClr val="accent1"/>
+          </a:fillRef>
+          <a:effectRef idx="0">
+            <a:schemeClr val="accent1"/>
+          </a:effectRef>
+          <a:fontRef idx="minor">
+            <a:schemeClr val="lt1"/>
+          </a:fontRef>
+        </p:style>
+        <p:txBody>
+          <a:bodyPr rtlCol="0" anchor="ctr"/>
+          <a:lstStyle/>
+          <a:p>
+            <a:pPr algn="ctr"/>
+            <a:endParaRPr lang="ko-KR" altLang="en-US"/>
+          </a:p>
+        </p:txBody>
+      </p:sp>
     </p:spTree>
     <p:extLst>
       <p:ext uri="{BB962C8B-B14F-4D97-AF65-F5344CB8AC3E}">

</xml_diff>